<commit_message>
NEW: hub-less modules (WIP)
</commit_message>
<xml_diff>
--- a/etc/docs/Diagrams.pptx
+++ b/etc/docs/Diagrams.pptx
@@ -5,7 +5,7 @@
     <p:sldMasterId id="2147483648" r:id="rId1"/>
   </p:sldMasterIdLst>
   <p:notesMasterIdLst>
-    <p:notesMasterId r:id="rId8"/>
+    <p:notesMasterId r:id="rId9"/>
   </p:notesMasterIdLst>
   <p:sldIdLst>
     <p:sldId id="256" r:id="rId2"/>
@@ -14,6 +14,7 @@
     <p:sldId id="259" r:id="rId5"/>
     <p:sldId id="260" r:id="rId6"/>
     <p:sldId id="261" r:id="rId7"/>
+    <p:sldId id="262" r:id="rId8"/>
   </p:sldIdLst>
   <p:sldSz cx="9144000" cy="6858000" type="screen4x3"/>
   <p:notesSz cx="6858000" cy="9144000"/>
@@ -213,7 +214,7 @@
           <a:p>
             <a:fld id="{62BE8112-61B9-4866-99D5-D85CDA96D7FA}" type="datetimeFigureOut">
               <a:rPr lang="en-US" smtClean="0"/>
-              <a:t>9/1/2014</a:t>
+              <a:t>4/9/2016</a:t>
             </a:fld>
             <a:endParaRPr lang="en-US"/>
           </a:p>
@@ -747,7 +748,7 @@
             <a:fld id="{1D8BD707-D9CF-40AE-B4C6-C98DA3205C09}" type="datetimeFigureOut">
               <a:rPr lang="en-US" smtClean="0"/>
               <a:pPr/>
-              <a:t>9/1/2014</a:t>
+              <a:t>4/9/2016</a:t>
             </a:fld>
             <a:endParaRPr lang="en-US"/>
           </a:p>
@@ -914,7 +915,7 @@
             <a:fld id="{1D8BD707-D9CF-40AE-B4C6-C98DA3205C09}" type="datetimeFigureOut">
               <a:rPr lang="en-US" smtClean="0"/>
               <a:pPr/>
-              <a:t>9/1/2014</a:t>
+              <a:t>4/9/2016</a:t>
             </a:fld>
             <a:endParaRPr lang="en-US"/>
           </a:p>
@@ -1091,7 +1092,7 @@
             <a:fld id="{1D8BD707-D9CF-40AE-B4C6-C98DA3205C09}" type="datetimeFigureOut">
               <a:rPr lang="en-US" smtClean="0"/>
               <a:pPr/>
-              <a:t>9/1/2014</a:t>
+              <a:t>4/9/2016</a:t>
             </a:fld>
             <a:endParaRPr lang="en-US"/>
           </a:p>
@@ -1258,7 +1259,7 @@
             <a:fld id="{1D8BD707-D9CF-40AE-B4C6-C98DA3205C09}" type="datetimeFigureOut">
               <a:rPr lang="en-US" smtClean="0"/>
               <a:pPr/>
-              <a:t>9/1/2014</a:t>
+              <a:t>4/9/2016</a:t>
             </a:fld>
             <a:endParaRPr lang="en-US"/>
           </a:p>
@@ -1501,7 +1502,7 @@
             <a:fld id="{1D8BD707-D9CF-40AE-B4C6-C98DA3205C09}" type="datetimeFigureOut">
               <a:rPr lang="en-US" smtClean="0"/>
               <a:pPr/>
-              <a:t>9/1/2014</a:t>
+              <a:t>4/9/2016</a:t>
             </a:fld>
             <a:endParaRPr lang="en-US"/>
           </a:p>
@@ -1786,7 +1787,7 @@
             <a:fld id="{1D8BD707-D9CF-40AE-B4C6-C98DA3205C09}" type="datetimeFigureOut">
               <a:rPr lang="en-US" smtClean="0"/>
               <a:pPr/>
-              <a:t>9/1/2014</a:t>
+              <a:t>4/9/2016</a:t>
             </a:fld>
             <a:endParaRPr lang="en-US"/>
           </a:p>
@@ -2205,7 +2206,7 @@
             <a:fld id="{1D8BD707-D9CF-40AE-B4C6-C98DA3205C09}" type="datetimeFigureOut">
               <a:rPr lang="en-US" smtClean="0"/>
               <a:pPr/>
-              <a:t>9/1/2014</a:t>
+              <a:t>4/9/2016</a:t>
             </a:fld>
             <a:endParaRPr lang="en-US"/>
           </a:p>
@@ -2320,7 +2321,7 @@
             <a:fld id="{1D8BD707-D9CF-40AE-B4C6-C98DA3205C09}" type="datetimeFigureOut">
               <a:rPr lang="en-US" smtClean="0"/>
               <a:pPr/>
-              <a:t>9/1/2014</a:t>
+              <a:t>4/9/2016</a:t>
             </a:fld>
             <a:endParaRPr lang="en-US"/>
           </a:p>
@@ -2412,7 +2413,7 @@
             <a:fld id="{1D8BD707-D9CF-40AE-B4C6-C98DA3205C09}" type="datetimeFigureOut">
               <a:rPr lang="en-US" smtClean="0"/>
               <a:pPr/>
-              <a:t>9/1/2014</a:t>
+              <a:t>4/9/2016</a:t>
             </a:fld>
             <a:endParaRPr lang="en-US"/>
           </a:p>
@@ -2686,7 +2687,7 @@
             <a:fld id="{1D8BD707-D9CF-40AE-B4C6-C98DA3205C09}" type="datetimeFigureOut">
               <a:rPr lang="en-US" smtClean="0"/>
               <a:pPr/>
-              <a:t>9/1/2014</a:t>
+              <a:t>4/9/2016</a:t>
             </a:fld>
             <a:endParaRPr lang="en-US"/>
           </a:p>
@@ -2936,7 +2937,7 @@
             <a:fld id="{1D8BD707-D9CF-40AE-B4C6-C98DA3205C09}" type="datetimeFigureOut">
               <a:rPr lang="en-US" smtClean="0"/>
               <a:pPr/>
-              <a:t>9/1/2014</a:t>
+              <a:t>4/9/2016</a:t>
             </a:fld>
             <a:endParaRPr lang="en-US"/>
           </a:p>
@@ -3146,7 +3147,7 @@
             <a:fld id="{1D8BD707-D9CF-40AE-B4C6-C98DA3205C09}" type="datetimeFigureOut">
               <a:rPr lang="en-US" smtClean="0"/>
               <a:pPr/>
-              <a:t>9/1/2014</a:t>
+              <a:t>4/9/2016</a:t>
             </a:fld>
             <a:endParaRPr lang="en-US"/>
           </a:p>
@@ -8000,6 +8001,1027 @@
     <p:extLst>
       <p:ext uri="{BB962C8B-B14F-4D97-AF65-F5344CB8AC3E}">
         <p14:creationId xmlns:p14="http://schemas.microsoft.com/office/powerpoint/2010/main" val="1585489054"/>
+      </p:ext>
+    </p:extLst>
+  </p:cSld>
+  <p:clrMapOvr>
+    <a:masterClrMapping/>
+  </p:clrMapOvr>
+</p:sld>
+</file>
+
+<file path=ppt/slides/slide7.xml><?xml version="1.0" encoding="utf-8"?>
+<p:sld xmlns:a="http://schemas.openxmlformats.org/drawingml/2006/main" xmlns:r="http://schemas.openxmlformats.org/officeDocument/2006/relationships" xmlns:p="http://schemas.openxmlformats.org/presentationml/2006/main">
+  <p:cSld>
+    <p:spTree>
+      <p:nvGrpSpPr>
+        <p:cNvPr id="1" name=""/>
+        <p:cNvGrpSpPr/>
+        <p:nvPr/>
+      </p:nvGrpSpPr>
+      <p:grpSpPr>
+        <a:xfrm>
+          <a:off x="0" y="0"/>
+          <a:ext cx="0" cy="0"/>
+          <a:chOff x="0" y="0"/>
+          <a:chExt cx="0" cy="0"/>
+        </a:xfrm>
+      </p:grpSpPr>
+      <p:pic>
+        <p:nvPicPr>
+          <p:cNvPr id="2" name="Picture 1" descr="Viewing Gallery For - Little Boy Stick Figure"/>
+          <p:cNvPicPr>
+            <a:picLocks noChangeAspect="1"/>
+          </p:cNvPicPr>
+          <p:nvPr/>
+        </p:nvPicPr>
+        <p:blipFill>
+          <a:blip r:embed="rId2" cstate="print">
+            <a:extLst>
+              <a:ext uri="{28A0092B-C50C-407E-A947-70E740481C1C}">
+                <a14:useLocalDpi xmlns:a14="http://schemas.microsoft.com/office/drawing/2010/main" val="0"/>
+              </a:ext>
+            </a:extLst>
+          </a:blip>
+          <a:stretch>
+            <a:fillRect/>
+          </a:stretch>
+        </p:blipFill>
+        <p:spPr>
+          <a:xfrm>
+            <a:off x="2133600" y="2514599"/>
+            <a:ext cx="1981200" cy="2186453"/>
+          </a:xfrm>
+          <a:prstGeom prst="rect">
+            <a:avLst/>
+          </a:prstGeom>
+        </p:spPr>
+      </p:pic>
+      <p:grpSp>
+        <p:nvGrpSpPr>
+          <p:cNvPr id="12" name="Group 11"/>
+          <p:cNvGrpSpPr/>
+          <p:nvPr/>
+        </p:nvGrpSpPr>
+        <p:grpSpPr>
+          <a:xfrm>
+            <a:off x="3505200" y="1562099"/>
+            <a:ext cx="3810000" cy="1905000"/>
+            <a:chOff x="4343400" y="914400"/>
+            <a:chExt cx="4343400" cy="2291862"/>
+          </a:xfrm>
+          <a:scene3d>
+            <a:camera prst="perspectiveHeroicExtremeLeftFacing"/>
+            <a:lightRig rig="threePt" dir="t"/>
+          </a:scene3d>
+        </p:grpSpPr>
+        <p:sp>
+          <p:nvSpPr>
+            <p:cNvPr id="3" name="Rectangle 2"/>
+            <p:cNvSpPr/>
+            <p:nvPr/>
+          </p:nvSpPr>
+          <p:spPr>
+            <a:xfrm>
+              <a:off x="4343400" y="914400"/>
+              <a:ext cx="1447800" cy="762000"/>
+            </a:xfrm>
+            <a:prstGeom prst="rect">
+              <a:avLst/>
+            </a:prstGeom>
+          </p:spPr>
+          <p:style>
+            <a:lnRef idx="1">
+              <a:schemeClr val="accent1"/>
+            </a:lnRef>
+            <a:fillRef idx="2">
+              <a:schemeClr val="accent1"/>
+            </a:fillRef>
+            <a:effectRef idx="1">
+              <a:schemeClr val="accent1"/>
+            </a:effectRef>
+            <a:fontRef idx="minor">
+              <a:schemeClr val="dk1"/>
+            </a:fontRef>
+          </p:style>
+          <p:txBody>
+            <a:bodyPr rtlCol="0" anchor="ctr"/>
+            <a:lstStyle/>
+            <a:p>
+              <a:pPr algn="ctr"/>
+              <a:endParaRPr lang="en-US"/>
+            </a:p>
+          </p:txBody>
+        </p:sp>
+        <p:sp>
+          <p:nvSpPr>
+            <p:cNvPr id="4" name="Rectangle 3"/>
+            <p:cNvSpPr/>
+            <p:nvPr/>
+          </p:nvSpPr>
+          <p:spPr>
+            <a:xfrm>
+              <a:off x="5791200" y="914400"/>
+              <a:ext cx="1447800" cy="762000"/>
+            </a:xfrm>
+            <a:prstGeom prst="rect">
+              <a:avLst/>
+            </a:prstGeom>
+          </p:spPr>
+          <p:style>
+            <a:lnRef idx="1">
+              <a:schemeClr val="accent1"/>
+            </a:lnRef>
+            <a:fillRef idx="2">
+              <a:schemeClr val="accent1"/>
+            </a:fillRef>
+            <a:effectRef idx="1">
+              <a:schemeClr val="accent1"/>
+            </a:effectRef>
+            <a:fontRef idx="minor">
+              <a:schemeClr val="dk1"/>
+            </a:fontRef>
+          </p:style>
+          <p:txBody>
+            <a:bodyPr rtlCol="0" anchor="ctr"/>
+            <a:lstStyle/>
+            <a:p>
+              <a:pPr algn="ctr"/>
+              <a:endParaRPr lang="en-US"/>
+            </a:p>
+          </p:txBody>
+        </p:sp>
+        <p:sp>
+          <p:nvSpPr>
+            <p:cNvPr id="5" name="Rectangle 4"/>
+            <p:cNvSpPr/>
+            <p:nvPr/>
+          </p:nvSpPr>
+          <p:spPr>
+            <a:xfrm>
+              <a:off x="7239000" y="914400"/>
+              <a:ext cx="1447800" cy="762000"/>
+            </a:xfrm>
+            <a:prstGeom prst="rect">
+              <a:avLst/>
+            </a:prstGeom>
+          </p:spPr>
+          <p:style>
+            <a:lnRef idx="1">
+              <a:schemeClr val="accent1"/>
+            </a:lnRef>
+            <a:fillRef idx="2">
+              <a:schemeClr val="accent1"/>
+            </a:fillRef>
+            <a:effectRef idx="1">
+              <a:schemeClr val="accent1"/>
+            </a:effectRef>
+            <a:fontRef idx="minor">
+              <a:schemeClr val="dk1"/>
+            </a:fontRef>
+          </p:style>
+          <p:txBody>
+            <a:bodyPr rtlCol="0" anchor="ctr"/>
+            <a:lstStyle/>
+            <a:p>
+              <a:pPr algn="ctr"/>
+              <a:endParaRPr lang="en-US"/>
+            </a:p>
+          </p:txBody>
+        </p:sp>
+        <p:sp>
+          <p:nvSpPr>
+            <p:cNvPr id="6" name="Rectangle 5"/>
+            <p:cNvSpPr/>
+            <p:nvPr/>
+          </p:nvSpPr>
+          <p:spPr>
+            <a:xfrm>
+              <a:off x="4343400" y="1682262"/>
+              <a:ext cx="1447800" cy="762000"/>
+            </a:xfrm>
+            <a:prstGeom prst="rect">
+              <a:avLst/>
+            </a:prstGeom>
+          </p:spPr>
+          <p:style>
+            <a:lnRef idx="1">
+              <a:schemeClr val="accent1"/>
+            </a:lnRef>
+            <a:fillRef idx="2">
+              <a:schemeClr val="accent1"/>
+            </a:fillRef>
+            <a:effectRef idx="1">
+              <a:schemeClr val="accent1"/>
+            </a:effectRef>
+            <a:fontRef idx="minor">
+              <a:schemeClr val="dk1"/>
+            </a:fontRef>
+          </p:style>
+          <p:txBody>
+            <a:bodyPr rtlCol="0" anchor="ctr"/>
+            <a:lstStyle/>
+            <a:p>
+              <a:pPr algn="ctr"/>
+              <a:endParaRPr lang="en-US"/>
+            </a:p>
+          </p:txBody>
+        </p:sp>
+        <p:sp>
+          <p:nvSpPr>
+            <p:cNvPr id="7" name="Rectangle 6"/>
+            <p:cNvSpPr/>
+            <p:nvPr/>
+          </p:nvSpPr>
+          <p:spPr>
+            <a:xfrm>
+              <a:off x="5791200" y="1682262"/>
+              <a:ext cx="1447800" cy="762000"/>
+            </a:xfrm>
+            <a:prstGeom prst="rect">
+              <a:avLst/>
+            </a:prstGeom>
+          </p:spPr>
+          <p:style>
+            <a:lnRef idx="1">
+              <a:schemeClr val="accent1"/>
+            </a:lnRef>
+            <a:fillRef idx="2">
+              <a:schemeClr val="accent1"/>
+            </a:fillRef>
+            <a:effectRef idx="1">
+              <a:schemeClr val="accent1"/>
+            </a:effectRef>
+            <a:fontRef idx="minor">
+              <a:schemeClr val="dk1"/>
+            </a:fontRef>
+          </p:style>
+          <p:txBody>
+            <a:bodyPr rtlCol="0" anchor="ctr"/>
+            <a:lstStyle/>
+            <a:p>
+              <a:pPr algn="ctr"/>
+              <a:endParaRPr lang="en-US"/>
+            </a:p>
+          </p:txBody>
+        </p:sp>
+        <p:sp>
+          <p:nvSpPr>
+            <p:cNvPr id="8" name="Rectangle 7"/>
+            <p:cNvSpPr/>
+            <p:nvPr/>
+          </p:nvSpPr>
+          <p:spPr>
+            <a:xfrm>
+              <a:off x="7239000" y="1682262"/>
+              <a:ext cx="1447800" cy="762000"/>
+            </a:xfrm>
+            <a:prstGeom prst="rect">
+              <a:avLst/>
+            </a:prstGeom>
+          </p:spPr>
+          <p:style>
+            <a:lnRef idx="1">
+              <a:schemeClr val="accent1"/>
+            </a:lnRef>
+            <a:fillRef idx="2">
+              <a:schemeClr val="accent1"/>
+            </a:fillRef>
+            <a:effectRef idx="1">
+              <a:schemeClr val="accent1"/>
+            </a:effectRef>
+            <a:fontRef idx="minor">
+              <a:schemeClr val="dk1"/>
+            </a:fontRef>
+          </p:style>
+          <p:txBody>
+            <a:bodyPr rtlCol="0" anchor="ctr"/>
+            <a:lstStyle/>
+            <a:p>
+              <a:pPr algn="ctr"/>
+              <a:endParaRPr lang="en-US"/>
+            </a:p>
+          </p:txBody>
+        </p:sp>
+        <p:sp>
+          <p:nvSpPr>
+            <p:cNvPr id="9" name="Rectangle 8"/>
+            <p:cNvSpPr/>
+            <p:nvPr/>
+          </p:nvSpPr>
+          <p:spPr>
+            <a:xfrm>
+              <a:off x="4343400" y="2444262"/>
+              <a:ext cx="1447800" cy="762000"/>
+            </a:xfrm>
+            <a:prstGeom prst="rect">
+              <a:avLst/>
+            </a:prstGeom>
+          </p:spPr>
+          <p:style>
+            <a:lnRef idx="1">
+              <a:schemeClr val="accent1"/>
+            </a:lnRef>
+            <a:fillRef idx="2">
+              <a:schemeClr val="accent1"/>
+            </a:fillRef>
+            <a:effectRef idx="1">
+              <a:schemeClr val="accent1"/>
+            </a:effectRef>
+            <a:fontRef idx="minor">
+              <a:schemeClr val="dk1"/>
+            </a:fontRef>
+          </p:style>
+          <p:txBody>
+            <a:bodyPr rtlCol="0" anchor="ctr"/>
+            <a:lstStyle/>
+            <a:p>
+              <a:pPr algn="ctr"/>
+              <a:endParaRPr lang="en-US"/>
+            </a:p>
+          </p:txBody>
+        </p:sp>
+        <p:sp>
+          <p:nvSpPr>
+            <p:cNvPr id="10" name="Rectangle 9"/>
+            <p:cNvSpPr/>
+            <p:nvPr/>
+          </p:nvSpPr>
+          <p:spPr>
+            <a:xfrm>
+              <a:off x="5791200" y="2444262"/>
+              <a:ext cx="1447800" cy="762000"/>
+            </a:xfrm>
+            <a:prstGeom prst="rect">
+              <a:avLst/>
+            </a:prstGeom>
+          </p:spPr>
+          <p:style>
+            <a:lnRef idx="1">
+              <a:schemeClr val="accent1"/>
+            </a:lnRef>
+            <a:fillRef idx="2">
+              <a:schemeClr val="accent1"/>
+            </a:fillRef>
+            <a:effectRef idx="1">
+              <a:schemeClr val="accent1"/>
+            </a:effectRef>
+            <a:fontRef idx="minor">
+              <a:schemeClr val="dk1"/>
+            </a:fontRef>
+          </p:style>
+          <p:txBody>
+            <a:bodyPr rtlCol="0" anchor="ctr"/>
+            <a:lstStyle/>
+            <a:p>
+              <a:pPr algn="ctr"/>
+              <a:endParaRPr lang="en-US"/>
+            </a:p>
+          </p:txBody>
+        </p:sp>
+        <p:sp>
+          <p:nvSpPr>
+            <p:cNvPr id="11" name="Rectangle 10"/>
+            <p:cNvSpPr/>
+            <p:nvPr/>
+          </p:nvSpPr>
+          <p:spPr>
+            <a:xfrm>
+              <a:off x="7239000" y="2444262"/>
+              <a:ext cx="1447800" cy="762000"/>
+            </a:xfrm>
+            <a:prstGeom prst="rect">
+              <a:avLst/>
+            </a:prstGeom>
+          </p:spPr>
+          <p:style>
+            <a:lnRef idx="1">
+              <a:schemeClr val="accent1"/>
+            </a:lnRef>
+            <a:fillRef idx="2">
+              <a:schemeClr val="accent1"/>
+            </a:fillRef>
+            <a:effectRef idx="1">
+              <a:schemeClr val="accent1"/>
+            </a:effectRef>
+            <a:fontRef idx="minor">
+              <a:schemeClr val="dk1"/>
+            </a:fontRef>
+          </p:style>
+          <p:txBody>
+            <a:bodyPr rtlCol="0" anchor="ctr"/>
+            <a:lstStyle/>
+            <a:p>
+              <a:pPr algn="ctr"/>
+              <a:endParaRPr lang="en-US"/>
+            </a:p>
+          </p:txBody>
+        </p:sp>
+      </p:grpSp>
+      <p:sp>
+        <p:nvSpPr>
+          <p:cNvPr id="13" name="Rectangle 12"/>
+          <p:cNvSpPr/>
+          <p:nvPr/>
+        </p:nvSpPr>
+        <p:spPr>
+          <a:xfrm>
+            <a:off x="3505200" y="1562099"/>
+            <a:ext cx="3810000" cy="1905000"/>
+          </a:xfrm>
+          <a:prstGeom prst="rect">
+            <a:avLst/>
+          </a:prstGeom>
+          <a:noFill/>
+          <a:ln>
+            <a:solidFill>
+              <a:schemeClr val="tx1"/>
+            </a:solidFill>
+          </a:ln>
+          <a:scene3d>
+            <a:camera prst="perspectiveHeroicExtremeLeftFacing"/>
+            <a:lightRig rig="threePt" dir="t"/>
+          </a:scene3d>
+        </p:spPr>
+        <p:style>
+          <a:lnRef idx="2">
+            <a:schemeClr val="accent1">
+              <a:shade val="50000"/>
+            </a:schemeClr>
+          </a:lnRef>
+          <a:fillRef idx="1">
+            <a:schemeClr val="accent1"/>
+          </a:fillRef>
+          <a:effectRef idx="0">
+            <a:schemeClr val="accent1"/>
+          </a:effectRef>
+          <a:fontRef idx="minor">
+            <a:schemeClr val="lt1"/>
+          </a:fontRef>
+        </p:style>
+        <p:txBody>
+          <a:bodyPr rtlCol="0" anchor="ctr"/>
+          <a:lstStyle/>
+          <a:p>
+            <a:pPr algn="ctr"/>
+            <a:endParaRPr lang="en-US"/>
+          </a:p>
+        </p:txBody>
+      </p:sp>
+      <p:cxnSp>
+        <p:nvCxnSpPr>
+          <p:cNvPr id="16" name="Straight Arrow Connector 15"/>
+          <p:cNvCxnSpPr/>
+          <p:nvPr/>
+        </p:nvCxnSpPr>
+        <p:spPr>
+          <a:xfrm flipV="1">
+            <a:off x="5105400" y="4038600"/>
+            <a:ext cx="0" cy="457200"/>
+          </a:xfrm>
+          <a:prstGeom prst="straightConnector1">
+            <a:avLst/>
+          </a:prstGeom>
+          <a:ln>
+            <a:tailEnd type="triangle"/>
+          </a:ln>
+        </p:spPr>
+        <p:style>
+          <a:lnRef idx="3">
+            <a:schemeClr val="accent1"/>
+          </a:lnRef>
+          <a:fillRef idx="0">
+            <a:schemeClr val="accent1"/>
+          </a:fillRef>
+          <a:effectRef idx="2">
+            <a:schemeClr val="accent1"/>
+          </a:effectRef>
+          <a:fontRef idx="minor">
+            <a:schemeClr val="tx1"/>
+          </a:fontRef>
+        </p:style>
+      </p:cxnSp>
+      <p:cxnSp>
+        <p:nvCxnSpPr>
+          <p:cNvPr id="18" name="Straight Arrow Connector 17"/>
+          <p:cNvCxnSpPr/>
+          <p:nvPr/>
+        </p:nvCxnSpPr>
+        <p:spPr>
+          <a:xfrm>
+            <a:off x="5105400" y="4495800"/>
+            <a:ext cx="457200" cy="0"/>
+          </a:xfrm>
+          <a:prstGeom prst="straightConnector1">
+            <a:avLst/>
+          </a:prstGeom>
+          <a:ln>
+            <a:tailEnd type="triangle"/>
+          </a:ln>
+        </p:spPr>
+        <p:style>
+          <a:lnRef idx="3">
+            <a:schemeClr val="accent2"/>
+          </a:lnRef>
+          <a:fillRef idx="0">
+            <a:schemeClr val="accent2"/>
+          </a:fillRef>
+          <a:effectRef idx="2">
+            <a:schemeClr val="accent2"/>
+          </a:effectRef>
+          <a:fontRef idx="minor">
+            <a:schemeClr val="tx1"/>
+          </a:fontRef>
+        </p:style>
+      </p:cxnSp>
+      <p:cxnSp>
+        <p:nvCxnSpPr>
+          <p:cNvPr id="21" name="Straight Arrow Connector 20"/>
+          <p:cNvCxnSpPr/>
+          <p:nvPr/>
+        </p:nvCxnSpPr>
+        <p:spPr>
+          <a:xfrm flipH="1">
+            <a:off x="4953000" y="4495800"/>
+            <a:ext cx="152400" cy="304800"/>
+          </a:xfrm>
+          <a:prstGeom prst="straightConnector1">
+            <a:avLst/>
+          </a:prstGeom>
+          <a:ln>
+            <a:tailEnd type="triangle"/>
+          </a:ln>
+        </p:spPr>
+        <p:style>
+          <a:lnRef idx="3">
+            <a:schemeClr val="accent3"/>
+          </a:lnRef>
+          <a:fillRef idx="0">
+            <a:schemeClr val="accent3"/>
+          </a:fillRef>
+          <a:effectRef idx="2">
+            <a:schemeClr val="accent3"/>
+          </a:effectRef>
+          <a:fontRef idx="minor">
+            <a:schemeClr val="tx1"/>
+          </a:fontRef>
+        </p:style>
+      </p:cxnSp>
+      <p:sp>
+        <p:nvSpPr>
+          <p:cNvPr id="24" name="Oval 23"/>
+          <p:cNvSpPr/>
+          <p:nvPr/>
+        </p:nvSpPr>
+        <p:spPr>
+          <a:xfrm>
+            <a:off x="5029200" y="4419600"/>
+            <a:ext cx="152400" cy="152400"/>
+          </a:xfrm>
+          <a:prstGeom prst="ellipse">
+            <a:avLst/>
+          </a:prstGeom>
+        </p:spPr>
+        <p:style>
+          <a:lnRef idx="2">
+            <a:schemeClr val="dk1">
+              <a:shade val="50000"/>
+            </a:schemeClr>
+          </a:lnRef>
+          <a:fillRef idx="1">
+            <a:schemeClr val="dk1"/>
+          </a:fillRef>
+          <a:effectRef idx="0">
+            <a:schemeClr val="dk1"/>
+          </a:effectRef>
+          <a:fontRef idx="minor">
+            <a:schemeClr val="lt1"/>
+          </a:fontRef>
+        </p:style>
+        <p:txBody>
+          <a:bodyPr rtlCol="0" anchor="ctr"/>
+          <a:lstStyle/>
+          <a:p>
+            <a:pPr algn="ctr"/>
+            <a:endParaRPr lang="en-US"/>
+          </a:p>
+        </p:txBody>
+      </p:sp>
+      <p:sp>
+        <p:nvSpPr>
+          <p:cNvPr id="25" name="TextBox 24"/>
+          <p:cNvSpPr txBox="1"/>
+          <p:nvPr/>
+        </p:nvSpPr>
+        <p:spPr>
+          <a:xfrm>
+            <a:off x="5152292" y="4644851"/>
+            <a:ext cx="1245277" cy="338554"/>
+          </a:xfrm>
+          <a:prstGeom prst="rect">
+            <a:avLst/>
+          </a:prstGeom>
+          <a:noFill/>
+        </p:spPr>
+        <p:txBody>
+          <a:bodyPr wrap="none" rtlCol="0">
+            <a:spAutoFit/>
+          </a:bodyPr>
+          <a:lstStyle/>
+          <a:p>
+            <a:r>
+              <a:rPr lang="en-US" sz="1600" dirty="0" smtClean="0"/>
+              <a:t>World Origin</a:t>
+            </a:r>
+            <a:endParaRPr lang="en-US" sz="1600" dirty="0"/>
+          </a:p>
+        </p:txBody>
+      </p:sp>
+      <p:sp>
+        <p:nvSpPr>
+          <p:cNvPr id="26" name="Oval 25"/>
+          <p:cNvSpPr/>
+          <p:nvPr/>
+        </p:nvSpPr>
+        <p:spPr>
+          <a:xfrm>
+            <a:off x="3008523" y="4419600"/>
+            <a:ext cx="152400" cy="152400"/>
+          </a:xfrm>
+          <a:prstGeom prst="ellipse">
+            <a:avLst/>
+          </a:prstGeom>
+        </p:spPr>
+        <p:style>
+          <a:lnRef idx="2">
+            <a:schemeClr val="dk1">
+              <a:shade val="50000"/>
+            </a:schemeClr>
+          </a:lnRef>
+          <a:fillRef idx="1">
+            <a:schemeClr val="dk1"/>
+          </a:fillRef>
+          <a:effectRef idx="0">
+            <a:schemeClr val="dk1"/>
+          </a:effectRef>
+          <a:fontRef idx="minor">
+            <a:schemeClr val="lt1"/>
+          </a:fontRef>
+        </p:style>
+        <p:txBody>
+          <a:bodyPr rtlCol="0" anchor="ctr"/>
+          <a:lstStyle/>
+          <a:p>
+            <a:pPr algn="ctr"/>
+            <a:endParaRPr lang="en-US"/>
+          </a:p>
+        </p:txBody>
+      </p:sp>
+      <p:sp>
+        <p:nvSpPr>
+          <p:cNvPr id="27" name="TextBox 26"/>
+          <p:cNvSpPr txBox="1"/>
+          <p:nvPr/>
+        </p:nvSpPr>
+        <p:spPr>
+          <a:xfrm>
+            <a:off x="3131615" y="4644851"/>
+            <a:ext cx="1538883" cy="338554"/>
+          </a:xfrm>
+          <a:prstGeom prst="rect">
+            <a:avLst/>
+          </a:prstGeom>
+          <a:noFill/>
+        </p:spPr>
+        <p:txBody>
+          <a:bodyPr wrap="none" rtlCol="0">
+            <a:spAutoFit/>
+          </a:bodyPr>
+          <a:lstStyle/>
+          <a:p>
+            <a:r>
+              <a:rPr lang="en-US" sz="1600" dirty="0" smtClean="0"/>
+              <a:t>Camera Position</a:t>
+            </a:r>
+            <a:endParaRPr lang="en-US" sz="1600" dirty="0"/>
+          </a:p>
+        </p:txBody>
+      </p:sp>
+      <p:cxnSp>
+        <p:nvCxnSpPr>
+          <p:cNvPr id="29" name="Straight Arrow Connector 28"/>
+          <p:cNvCxnSpPr>
+            <a:stCxn id="27" idx="1"/>
+            <a:endCxn id="26" idx="4"/>
+          </p:cNvCxnSpPr>
+          <p:nvPr/>
+        </p:nvCxnSpPr>
+        <p:spPr>
+          <a:xfrm flipH="1" flipV="1">
+            <a:off x="3084723" y="4572000"/>
+            <a:ext cx="46892" cy="242128"/>
+          </a:xfrm>
+          <a:prstGeom prst="straightConnector1">
+            <a:avLst/>
+          </a:prstGeom>
+          <a:ln>
+            <a:tailEnd type="triangle"/>
+          </a:ln>
+        </p:spPr>
+        <p:style>
+          <a:lnRef idx="1">
+            <a:schemeClr val="dk1"/>
+          </a:lnRef>
+          <a:fillRef idx="0">
+            <a:schemeClr val="dk1"/>
+          </a:fillRef>
+          <a:effectRef idx="0">
+            <a:schemeClr val="dk1"/>
+          </a:effectRef>
+          <a:fontRef idx="minor">
+            <a:schemeClr val="tx1"/>
+          </a:fontRef>
+        </p:style>
+      </p:cxnSp>
+      <p:cxnSp>
+        <p:nvCxnSpPr>
+          <p:cNvPr id="32" name="Straight Arrow Connector 31"/>
+          <p:cNvCxnSpPr>
+            <a:stCxn id="25" idx="1"/>
+          </p:cNvCxnSpPr>
+          <p:nvPr/>
+        </p:nvCxnSpPr>
+        <p:spPr>
+          <a:xfrm flipH="1" flipV="1">
+            <a:off x="5125352" y="4568653"/>
+            <a:ext cx="26940" cy="245475"/>
+          </a:xfrm>
+          <a:prstGeom prst="straightConnector1">
+            <a:avLst/>
+          </a:prstGeom>
+          <a:ln>
+            <a:tailEnd type="triangle"/>
+          </a:ln>
+        </p:spPr>
+        <p:style>
+          <a:lnRef idx="1">
+            <a:schemeClr val="dk1"/>
+          </a:lnRef>
+          <a:fillRef idx="0">
+            <a:schemeClr val="dk1"/>
+          </a:fillRef>
+          <a:effectRef idx="0">
+            <a:schemeClr val="dk1"/>
+          </a:effectRef>
+          <a:fontRef idx="minor">
+            <a:schemeClr val="tx1"/>
+          </a:fontRef>
+        </p:style>
+      </p:cxnSp>
+      <p:sp>
+        <p:nvSpPr>
+          <p:cNvPr id="39" name="TextBox 38"/>
+          <p:cNvSpPr txBox="1"/>
+          <p:nvPr/>
+        </p:nvSpPr>
+        <p:spPr>
+          <a:xfrm>
+            <a:off x="1276141" y="2232246"/>
+            <a:ext cx="1174360" cy="338554"/>
+          </a:xfrm>
+          <a:prstGeom prst="rect">
+            <a:avLst/>
+          </a:prstGeom>
+          <a:noFill/>
+        </p:spPr>
+        <p:txBody>
+          <a:bodyPr wrap="none" rtlCol="0">
+            <a:spAutoFit/>
+          </a:bodyPr>
+          <a:lstStyle/>
+          <a:p>
+            <a:r>
+              <a:rPr lang="en-US" sz="1600" dirty="0" smtClean="0"/>
+              <a:t>Head Offset</a:t>
+            </a:r>
+            <a:endParaRPr lang="en-US" sz="1600" dirty="0"/>
+          </a:p>
+        </p:txBody>
+      </p:sp>
+      <p:cxnSp>
+        <p:nvCxnSpPr>
+          <p:cNvPr id="40" name="Straight Arrow Connector 39"/>
+          <p:cNvCxnSpPr>
+            <a:stCxn id="39" idx="3"/>
+          </p:cNvCxnSpPr>
+          <p:nvPr/>
+        </p:nvCxnSpPr>
+        <p:spPr>
+          <a:xfrm>
+            <a:off x="2450501" y="2401523"/>
+            <a:ext cx="634222" cy="432201"/>
+          </a:xfrm>
+          <a:prstGeom prst="straightConnector1">
+            <a:avLst/>
+          </a:prstGeom>
+          <a:ln>
+            <a:tailEnd type="triangle"/>
+          </a:ln>
+        </p:spPr>
+        <p:style>
+          <a:lnRef idx="1">
+            <a:schemeClr val="dk1"/>
+          </a:lnRef>
+          <a:fillRef idx="0">
+            <a:schemeClr val="dk1"/>
+          </a:fillRef>
+          <a:effectRef idx="0">
+            <a:schemeClr val="dk1"/>
+          </a:effectRef>
+          <a:fontRef idx="minor">
+            <a:schemeClr val="tx1"/>
+          </a:fontRef>
+        </p:style>
+      </p:cxnSp>
+      <p:sp>
+        <p:nvSpPr>
+          <p:cNvPr id="43" name="Oval 42"/>
+          <p:cNvSpPr/>
+          <p:nvPr/>
+        </p:nvSpPr>
+        <p:spPr>
+          <a:xfrm>
+            <a:off x="5305130" y="2441009"/>
+            <a:ext cx="152400" cy="152400"/>
+          </a:xfrm>
+          <a:prstGeom prst="ellipse">
+            <a:avLst/>
+          </a:prstGeom>
+        </p:spPr>
+        <p:style>
+          <a:lnRef idx="2">
+            <a:schemeClr val="dk1">
+              <a:shade val="50000"/>
+            </a:schemeClr>
+          </a:lnRef>
+          <a:fillRef idx="1">
+            <a:schemeClr val="dk1"/>
+          </a:fillRef>
+          <a:effectRef idx="0">
+            <a:schemeClr val="dk1"/>
+          </a:effectRef>
+          <a:fontRef idx="minor">
+            <a:schemeClr val="lt1"/>
+          </a:fontRef>
+        </p:style>
+        <p:txBody>
+          <a:bodyPr rtlCol="0" anchor="ctr"/>
+          <a:lstStyle/>
+          <a:p>
+            <a:pPr algn="ctr"/>
+            <a:endParaRPr lang="en-US"/>
+          </a:p>
+        </p:txBody>
+      </p:sp>
+      <p:sp>
+        <p:nvSpPr>
+          <p:cNvPr id="44" name="TextBox 43"/>
+          <p:cNvSpPr txBox="1"/>
+          <p:nvPr/>
+        </p:nvSpPr>
+        <p:spPr>
+          <a:xfrm>
+            <a:off x="4518220" y="768518"/>
+            <a:ext cx="2220095" cy="584775"/>
+          </a:xfrm>
+          <a:prstGeom prst="rect">
+            <a:avLst/>
+          </a:prstGeom>
+          <a:noFill/>
+        </p:spPr>
+        <p:txBody>
+          <a:bodyPr wrap="none" rtlCol="0">
+            <a:spAutoFit/>
+          </a:bodyPr>
+          <a:lstStyle/>
+          <a:p>
+            <a:r>
+              <a:rPr lang="en-US" sz="1600" dirty="0" smtClean="0"/>
+              <a:t>Reference Offset</a:t>
+            </a:r>
+          </a:p>
+          <a:p>
+            <a:r>
+              <a:rPr lang="en-US" sz="1600" dirty="0" smtClean="0"/>
+              <a:t>(center of reference tile)</a:t>
+            </a:r>
+            <a:endParaRPr lang="en-US" sz="1600" dirty="0"/>
+          </a:p>
+        </p:txBody>
+      </p:sp>
+      <p:cxnSp>
+        <p:nvCxnSpPr>
+          <p:cNvPr id="45" name="Straight Arrow Connector 44"/>
+          <p:cNvCxnSpPr>
+            <a:stCxn id="44" idx="2"/>
+            <a:endCxn id="43" idx="0"/>
+          </p:cNvCxnSpPr>
+          <p:nvPr/>
+        </p:nvCxnSpPr>
+        <p:spPr>
+          <a:xfrm flipH="1">
+            <a:off x="5381330" y="1353293"/>
+            <a:ext cx="246938" cy="1087716"/>
+          </a:xfrm>
+          <a:prstGeom prst="straightConnector1">
+            <a:avLst/>
+          </a:prstGeom>
+          <a:ln>
+            <a:tailEnd type="triangle"/>
+          </a:ln>
+        </p:spPr>
+        <p:style>
+          <a:lnRef idx="1">
+            <a:schemeClr val="dk1"/>
+          </a:lnRef>
+          <a:fillRef idx="0">
+            <a:schemeClr val="dk1"/>
+          </a:fillRef>
+          <a:effectRef idx="0">
+            <a:schemeClr val="dk1"/>
+          </a:effectRef>
+          <a:fontRef idx="minor">
+            <a:schemeClr val="tx1"/>
+          </a:fontRef>
+        </p:style>
+      </p:cxnSp>
+      <p:cxnSp>
+        <p:nvCxnSpPr>
+          <p:cNvPr id="48" name="Straight Arrow Connector 47"/>
+          <p:cNvCxnSpPr/>
+          <p:nvPr/>
+        </p:nvCxnSpPr>
+        <p:spPr>
+          <a:xfrm>
+            <a:off x="3516277" y="1142139"/>
+            <a:ext cx="1512923" cy="1163654"/>
+          </a:xfrm>
+          <a:prstGeom prst="straightConnector1">
+            <a:avLst/>
+          </a:prstGeom>
+          <a:ln>
+            <a:tailEnd type="triangle"/>
+          </a:ln>
+        </p:spPr>
+        <p:style>
+          <a:lnRef idx="1">
+            <a:schemeClr val="dk1"/>
+          </a:lnRef>
+          <a:fillRef idx="0">
+            <a:schemeClr val="dk1"/>
+          </a:fillRef>
+          <a:effectRef idx="0">
+            <a:schemeClr val="dk1"/>
+          </a:effectRef>
+          <a:fontRef idx="minor">
+            <a:schemeClr val="tx1"/>
+          </a:fontRef>
+        </p:style>
+      </p:cxnSp>
+      <p:sp>
+        <p:nvSpPr>
+          <p:cNvPr id="51" name="TextBox 50"/>
+          <p:cNvSpPr txBox="1"/>
+          <p:nvPr/>
+        </p:nvSpPr>
+        <p:spPr>
+          <a:xfrm>
+            <a:off x="2341917" y="843412"/>
+            <a:ext cx="1364091" cy="338554"/>
+          </a:xfrm>
+          <a:prstGeom prst="rect">
+            <a:avLst/>
+          </a:prstGeom>
+          <a:noFill/>
+        </p:spPr>
+        <p:txBody>
+          <a:bodyPr wrap="none" rtlCol="0">
+            <a:spAutoFit/>
+          </a:bodyPr>
+          <a:lstStyle/>
+          <a:p>
+            <a:r>
+              <a:rPr lang="en-US" sz="1600" dirty="0" smtClean="0"/>
+              <a:t>Reference Tile</a:t>
+            </a:r>
+            <a:endParaRPr lang="en-US" sz="1600" dirty="0"/>
+          </a:p>
+        </p:txBody>
+      </p:sp>
+    </p:spTree>
+    <p:extLst>
+      <p:ext uri="{BB962C8B-B14F-4D97-AF65-F5344CB8AC3E}">
+        <p14:creationId xmlns:p14="http://schemas.microsoft.com/office/powerpoint/2010/main" val="2130882180"/>
       </p:ext>
     </p:extLst>
   </p:cSld>

</xml_diff>